<commit_message>
Update HaccVerse'25 Idea Submission Template with new content
</commit_message>
<xml_diff>
--- a/src/assets/HaccVerse'25_IdeaSubmission_Template.pptx
+++ b/src/assets/HaccVerse'25_IdeaSubmission_Template.pptx
@@ -9,21 +9,22 @@
     <p:sldId id="257" r:id="rId3"/>
     <p:sldId id="258" r:id="rId4"/>
     <p:sldId id="259" r:id="rId5"/>
-    <p:sldId id="260" r:id="rId6"/>
-    <p:sldId id="261" r:id="rId7"/>
-    <p:sldId id="262" r:id="rId8"/>
-    <p:sldId id="263" r:id="rId9"/>
+    <p:sldId id="265" r:id="rId6"/>
+    <p:sldId id="260" r:id="rId7"/>
+    <p:sldId id="261" r:id="rId8"/>
+    <p:sldId id="262" r:id="rId9"/>
+    <p:sldId id="263" r:id="rId10"/>
   </p:sldIdLst>
   <p:sldSz cx="18288000" cy="10287000"/>
   <p:notesSz cx="6858000" cy="9144000"/>
   <p:embeddedFontLst>
     <p:embeddedFont>
       <p:font typeface="Arimo Bold" panose="020B0604020202020204" charset="0"/>
-      <p:regular r:id="rId10"/>
+      <p:regular r:id="rId11"/>
     </p:embeddedFont>
     <p:embeddedFont>
       <p:font typeface="Glacial Indifference Bold" panose="020B0604020202020204" charset="0"/>
-      <p:regular r:id="rId11"/>
+      <p:regular r:id="rId12"/>
     </p:embeddedFont>
   </p:embeddedFontLst>
   <p:defaultTextStyle>
@@ -320,7 +321,7 @@
             <a:fld id="{1D8BD707-D9CF-40AE-B4C6-C98DA3205C09}" type="datetimeFigureOut">
               <a:rPr lang="en-US" smtClean="0"/>
               <a:pPr/>
-              <a:t>2/26/2025</a:t>
+              <a:t>3/1/2025</a:t>
             </a:fld>
             <a:endParaRPr lang="en-US"/>
           </a:p>
@@ -485,7 +486,7 @@
             <a:fld id="{1D8BD707-D9CF-40AE-B4C6-C98DA3205C09}" type="datetimeFigureOut">
               <a:rPr lang="en-US" smtClean="0"/>
               <a:pPr/>
-              <a:t>2/26/2025</a:t>
+              <a:t>3/1/2025</a:t>
             </a:fld>
             <a:endParaRPr lang="en-US"/>
           </a:p>
@@ -660,7 +661,7 @@
             <a:fld id="{1D8BD707-D9CF-40AE-B4C6-C98DA3205C09}" type="datetimeFigureOut">
               <a:rPr lang="en-US" smtClean="0"/>
               <a:pPr/>
-              <a:t>2/26/2025</a:t>
+              <a:t>3/1/2025</a:t>
             </a:fld>
             <a:endParaRPr lang="en-US"/>
           </a:p>
@@ -825,7 +826,7 @@
             <a:fld id="{1D8BD707-D9CF-40AE-B4C6-C98DA3205C09}" type="datetimeFigureOut">
               <a:rPr lang="en-US" smtClean="0"/>
               <a:pPr/>
-              <a:t>2/26/2025</a:t>
+              <a:t>3/1/2025</a:t>
             </a:fld>
             <a:endParaRPr lang="en-US"/>
           </a:p>
@@ -1067,7 +1068,7 @@
             <a:fld id="{1D8BD707-D9CF-40AE-B4C6-C98DA3205C09}" type="datetimeFigureOut">
               <a:rPr lang="en-US" smtClean="0"/>
               <a:pPr/>
-              <a:t>2/26/2025</a:t>
+              <a:t>3/1/2025</a:t>
             </a:fld>
             <a:endParaRPr lang="en-US"/>
           </a:p>
@@ -1349,7 +1350,7 @@
             <a:fld id="{1D8BD707-D9CF-40AE-B4C6-C98DA3205C09}" type="datetimeFigureOut">
               <a:rPr lang="en-US" smtClean="0"/>
               <a:pPr/>
-              <a:t>2/26/2025</a:t>
+              <a:t>3/1/2025</a:t>
             </a:fld>
             <a:endParaRPr lang="en-US"/>
           </a:p>
@@ -1765,7 +1766,7 @@
             <a:fld id="{1D8BD707-D9CF-40AE-B4C6-C98DA3205C09}" type="datetimeFigureOut">
               <a:rPr lang="en-US" smtClean="0"/>
               <a:pPr/>
-              <a:t>2/26/2025</a:t>
+              <a:t>3/1/2025</a:t>
             </a:fld>
             <a:endParaRPr lang="en-US"/>
           </a:p>
@@ -1879,7 +1880,7 @@
             <a:fld id="{1D8BD707-D9CF-40AE-B4C6-C98DA3205C09}" type="datetimeFigureOut">
               <a:rPr lang="en-US" smtClean="0"/>
               <a:pPr/>
-              <a:t>2/26/2025</a:t>
+              <a:t>3/1/2025</a:t>
             </a:fld>
             <a:endParaRPr lang="en-US"/>
           </a:p>
@@ -1971,7 +1972,7 @@
             <a:fld id="{1D8BD707-D9CF-40AE-B4C6-C98DA3205C09}" type="datetimeFigureOut">
               <a:rPr lang="en-US" smtClean="0"/>
               <a:pPr/>
-              <a:t>2/26/2025</a:t>
+              <a:t>3/1/2025</a:t>
             </a:fld>
             <a:endParaRPr lang="en-US"/>
           </a:p>
@@ -2243,7 +2244,7 @@
             <a:fld id="{1D8BD707-D9CF-40AE-B4C6-C98DA3205C09}" type="datetimeFigureOut">
               <a:rPr lang="en-US" smtClean="0"/>
               <a:pPr/>
-              <a:t>2/26/2025</a:t>
+              <a:t>3/1/2025</a:t>
             </a:fld>
             <a:endParaRPr lang="en-US"/>
           </a:p>
@@ -2492,7 +2493,7 @@
             <a:fld id="{1D8BD707-D9CF-40AE-B4C6-C98DA3205C09}" type="datetimeFigureOut">
               <a:rPr lang="en-US" smtClean="0"/>
               <a:pPr/>
-              <a:t>2/26/2025</a:t>
+              <a:t>3/1/2025</a:t>
             </a:fld>
             <a:endParaRPr lang="en-US"/>
           </a:p>
@@ -2700,7 +2701,7 @@
             <a:fld id="{1D8BD707-D9CF-40AE-B4C6-C98DA3205C09}" type="datetimeFigureOut">
               <a:rPr lang="en-US" smtClean="0"/>
               <a:pPr/>
-              <a:t>2/26/2025</a:t>
+              <a:t>3/1/2025</a:t>
             </a:fld>
             <a:endParaRPr lang="en-US"/>
           </a:p>
@@ -5340,7 +5341,13 @@
     </p:bg>
     <p:spTree>
       <p:nvGrpSpPr>
-        <p:cNvPr id="1" name=""/>
+        <p:cNvPr id="1" name="">
+          <a:extLst>
+            <a:ext uri="{FF2B5EF4-FFF2-40B4-BE49-F238E27FC236}">
+              <a16:creationId xmlns:a16="http://schemas.microsoft.com/office/drawing/2014/main" id="{D30C7401-1653-6484-2F69-415CAFCF36AC}"/>
+            </a:ext>
+          </a:extLst>
+        </p:cNvPr>
         <p:cNvGrpSpPr/>
         <p:nvPr/>
       </p:nvGrpSpPr>
@@ -5354,14 +5361,20 @@
       </p:grpSpPr>
       <p:sp>
         <p:nvSpPr>
-          <p:cNvPr id="2" name="TextBox 2"/>
+          <p:cNvPr id="2" name="TextBox 2">
+            <a:extLst>
+              <a:ext uri="{FF2B5EF4-FFF2-40B4-BE49-F238E27FC236}">
+                <a16:creationId xmlns:a16="http://schemas.microsoft.com/office/drawing/2014/main" id="{7A2C1B4C-D15C-25AE-064D-E3C348307BF0}"/>
+              </a:ext>
+            </a:extLst>
+          </p:cNvPr>
           <p:cNvSpPr txBox="1"/>
           <p:nvPr/>
         </p:nvSpPr>
         <p:spPr>
           <a:xfrm>
-            <a:off x="7344430" y="158953"/>
-            <a:ext cx="3780770" cy="833562"/>
+            <a:off x="8163446" y="158955"/>
+            <a:ext cx="1742553" cy="833562"/>
           </a:xfrm>
           <a:prstGeom prst="rect">
             <a:avLst/>
@@ -5382,7 +5395,7 @@
               </a:spcBef>
             </a:pPr>
             <a:r>
-              <a:rPr lang="en-US" sz="6380" b="1" spc="-127" dirty="0">
+              <a:rPr lang="en-US" sz="6379" b="1" spc="-127" dirty="0">
                 <a:solidFill>
                   <a:srgbClr val="FFFFFF"/>
                 </a:solidFill>
@@ -5391,14 +5404,70 @@
                 <a:cs typeface="Glacial Indifference Bold"/>
                 <a:sym typeface="Glacial Indifference Bold"/>
               </a:rPr>
-              <a:t>FEATURES</a:t>
-            </a:r>
-          </a:p>
-        </p:txBody>
-      </p:sp>
-      <p:sp>
-        <p:nvSpPr>
-          <p:cNvPr id="3" name="Freeform 3"/>
+              <a:t>IDEA</a:t>
+            </a:r>
+          </a:p>
+        </p:txBody>
+      </p:sp>
+      <p:sp>
+        <p:nvSpPr>
+          <p:cNvPr id="4" name="TextBox 4">
+            <a:extLst>
+              <a:ext uri="{FF2B5EF4-FFF2-40B4-BE49-F238E27FC236}">
+                <a16:creationId xmlns:a16="http://schemas.microsoft.com/office/drawing/2014/main" id="{074564BA-30C9-508F-5587-6E9FD5188FE2}"/>
+              </a:ext>
+            </a:extLst>
+          </p:cNvPr>
+          <p:cNvSpPr txBox="1"/>
+          <p:nvPr/>
+        </p:nvSpPr>
+        <p:spPr>
+          <a:xfrm>
+            <a:off x="1219200" y="1333500"/>
+            <a:ext cx="2247900" cy="503225"/>
+          </a:xfrm>
+          <a:prstGeom prst="rect">
+            <a:avLst/>
+          </a:prstGeom>
+        </p:spPr>
+        <p:txBody>
+          <a:bodyPr wrap="square" lIns="0" tIns="0" rIns="0" bIns="0" rtlCol="0" anchor="t">
+            <a:spAutoFit/>
+          </a:bodyPr>
+          <a:lstStyle/>
+          <a:p>
+            <a:pPr algn="ctr">
+              <a:lnSpc>
+                <a:spcPts val="3753"/>
+              </a:lnSpc>
+              <a:spcBef>
+                <a:spcPct val="0"/>
+              </a:spcBef>
+            </a:pPr>
+            <a:r>
+              <a:rPr lang="en-US" sz="3680" b="1" spc="-73" dirty="0">
+                <a:solidFill>
+                  <a:srgbClr val="FFFFFF"/>
+                </a:solidFill>
+                <a:latin typeface="Glacial Indifference Bold"/>
+                <a:ea typeface="Glacial Indifference Bold"/>
+                <a:cs typeface="Glacial Indifference Bold"/>
+                <a:sym typeface="Glacial Indifference Bold"/>
+              </a:rPr>
+              <a:t>SOLUTION</a:t>
+            </a:r>
+          </a:p>
+        </p:txBody>
+      </p:sp>
+      <p:sp>
+        <p:nvSpPr>
+          <p:cNvPr id="5" name="Freeform 5">
+            <a:extLst>
+              <a:ext uri="{FF2B5EF4-FFF2-40B4-BE49-F238E27FC236}">
+                <a16:creationId xmlns:a16="http://schemas.microsoft.com/office/drawing/2014/main" id="{257CDBAF-A875-A8A8-BCC8-500A35FAF838}"/>
+              </a:ext>
+            </a:extLst>
+          </p:cNvPr>
           <p:cNvSpPr/>
           <p:nvPr/>
         </p:nvSpPr>
@@ -5450,14 +5519,20 @@
       </p:sp>
       <p:sp>
         <p:nvSpPr>
-          <p:cNvPr id="4" name="TextBox 4"/>
+          <p:cNvPr id="7" name="TextBox 7">
+            <a:extLst>
+              <a:ext uri="{FF2B5EF4-FFF2-40B4-BE49-F238E27FC236}">
+                <a16:creationId xmlns:a16="http://schemas.microsoft.com/office/drawing/2014/main" id="{D83E9466-776D-2234-75AC-92F15F381773}"/>
+              </a:ext>
+            </a:extLst>
+          </p:cNvPr>
           <p:cNvSpPr txBox="1"/>
           <p:nvPr/>
         </p:nvSpPr>
         <p:spPr>
           <a:xfrm>
-            <a:off x="5253156" y="1446009"/>
-            <a:ext cx="7929444" cy="503225"/>
+            <a:off x="4996122" y="3543300"/>
+            <a:ext cx="8077200" cy="499367"/>
           </a:xfrm>
           <a:prstGeom prst="rect">
             <a:avLst/>
@@ -5478,21 +5553,31 @@
               </a:spcBef>
             </a:pPr>
             <a:r>
-              <a:rPr lang="en-US" sz="3680" b="1" spc="-73" dirty="0">
+              <a:rPr lang="en-US" sz="4000" dirty="0">
                 <a:solidFill>
-                  <a:srgbClr val="FFFFFF"/>
+                  <a:schemeClr val="bg1"/>
                 </a:solidFill>
-                <a:latin typeface="Glacial Indifference Bold"/>
-                <a:ea typeface="Glacial Indifference Bold"/>
-                <a:cs typeface="Glacial Indifference Bold"/>
-                <a:sym typeface="Glacial Indifference Bold"/>
               </a:rPr>
-              <a:t>List 3-4 main features of your solution</a:t>
-            </a:r>
+              <a:t>You have an extra slide—use it wisely.</a:t>
+            </a:r>
+            <a:endParaRPr lang="en-US" sz="3680" b="1" spc="-73" dirty="0">
+              <a:solidFill>
+                <a:schemeClr val="bg1"/>
+              </a:solidFill>
+              <a:latin typeface="Glacial Indifference Bold"/>
+              <a:ea typeface="Glacial Indifference Bold"/>
+              <a:cs typeface="Glacial Indifference Bold"/>
+              <a:sym typeface="Glacial Indifference Bold"/>
+            </a:endParaRPr>
           </a:p>
         </p:txBody>
       </p:sp>
     </p:spTree>
+    <p:extLst>
+      <p:ext uri="{BB962C8B-B14F-4D97-AF65-F5344CB8AC3E}">
+        <p14:creationId xmlns:p14="http://schemas.microsoft.com/office/powerpoint/2010/main" val="10550351"/>
+      </p:ext>
+    </p:extLst>
   </p:cSld>
   <p:clrMapOvr>
     <a:masterClrMapping/>
@@ -5533,8 +5618,8 @@
         </p:nvSpPr>
         <p:spPr>
           <a:xfrm>
-            <a:off x="6842522" y="158953"/>
-            <a:ext cx="4739878" cy="833562"/>
+            <a:off x="7344430" y="158953"/>
+            <a:ext cx="3780770" cy="833562"/>
           </a:xfrm>
           <a:prstGeom prst="rect">
             <a:avLst/>
@@ -5564,7 +5649,7 @@
                 <a:cs typeface="Glacial Indifference Bold"/>
                 <a:sym typeface="Glacial Indifference Bold"/>
               </a:rPr>
-              <a:t>FLOWCHART</a:t>
+              <a:t>FEATURES</a:t>
             </a:r>
           </a:p>
         </p:txBody>
@@ -5629,8 +5714,8 @@
         </p:nvSpPr>
         <p:spPr>
           <a:xfrm>
-            <a:off x="3229630" y="1309756"/>
-            <a:ext cx="11857970" cy="503225"/>
+            <a:off x="5253156" y="1446009"/>
+            <a:ext cx="7929444" cy="503225"/>
           </a:xfrm>
           <a:prstGeom prst="rect">
             <a:avLst/>
@@ -5660,7 +5745,7 @@
                 <a:cs typeface="Glacial Indifference Bold"/>
                 <a:sym typeface="Glacial Indifference Bold"/>
               </a:rPr>
-              <a:t>How does your solution work? (Flowchart Representation)</a:t>
+              <a:t>List 3-4 main features of your solution</a:t>
             </a:r>
           </a:p>
         </p:txBody>
@@ -5706,8 +5791,8 @@
         </p:nvSpPr>
         <p:spPr>
           <a:xfrm>
-            <a:off x="6820198" y="158953"/>
-            <a:ext cx="4762202" cy="833562"/>
+            <a:off x="6842522" y="158953"/>
+            <a:ext cx="4739878" cy="833562"/>
           </a:xfrm>
           <a:prstGeom prst="rect">
             <a:avLst/>
@@ -5737,7 +5822,7 @@
                 <a:cs typeface="Glacial Indifference Bold"/>
                 <a:sym typeface="Glacial Indifference Bold"/>
               </a:rPr>
-              <a:t>TECH STACK</a:t>
+              <a:t>FLOWCHART</a:t>
             </a:r>
           </a:p>
         </p:txBody>
@@ -5802,6 +5887,179 @@
         </p:nvSpPr>
         <p:spPr>
           <a:xfrm>
+            <a:off x="3229630" y="1309756"/>
+            <a:ext cx="11857970" cy="503225"/>
+          </a:xfrm>
+          <a:prstGeom prst="rect">
+            <a:avLst/>
+          </a:prstGeom>
+        </p:spPr>
+        <p:txBody>
+          <a:bodyPr wrap="square" lIns="0" tIns="0" rIns="0" bIns="0" rtlCol="0" anchor="t">
+            <a:spAutoFit/>
+          </a:bodyPr>
+          <a:lstStyle/>
+          <a:p>
+            <a:pPr algn="ctr">
+              <a:lnSpc>
+                <a:spcPts val="3753"/>
+              </a:lnSpc>
+              <a:spcBef>
+                <a:spcPct val="0"/>
+              </a:spcBef>
+            </a:pPr>
+            <a:r>
+              <a:rPr lang="en-US" sz="3680" b="1" spc="-73" dirty="0">
+                <a:solidFill>
+                  <a:srgbClr val="FFFFFF"/>
+                </a:solidFill>
+                <a:latin typeface="Glacial Indifference Bold"/>
+                <a:ea typeface="Glacial Indifference Bold"/>
+                <a:cs typeface="Glacial Indifference Bold"/>
+                <a:sym typeface="Glacial Indifference Bold"/>
+              </a:rPr>
+              <a:t>How does your solution work? (Flowchart Representation)</a:t>
+            </a:r>
+          </a:p>
+        </p:txBody>
+      </p:sp>
+    </p:spTree>
+  </p:cSld>
+  <p:clrMapOvr>
+    <a:masterClrMapping/>
+  </p:clrMapOvr>
+</p:sld>
+</file>
+
+<file path=ppt/slides/slide8.xml><?xml version="1.0" encoding="utf-8"?>
+<p:sld xmlns:a="http://schemas.openxmlformats.org/drawingml/2006/main" xmlns:r="http://schemas.openxmlformats.org/officeDocument/2006/relationships" xmlns:p="http://schemas.openxmlformats.org/presentationml/2006/main">
+  <p:cSld>
+    <p:bg>
+      <p:bgPr>
+        <a:solidFill>
+          <a:srgbClr val="0F0421"/>
+        </a:solidFill>
+        <a:effectLst/>
+      </p:bgPr>
+    </p:bg>
+    <p:spTree>
+      <p:nvGrpSpPr>
+        <p:cNvPr id="1" name=""/>
+        <p:cNvGrpSpPr/>
+        <p:nvPr/>
+      </p:nvGrpSpPr>
+      <p:grpSpPr>
+        <a:xfrm>
+          <a:off x="0" y="0"/>
+          <a:ext cx="0" cy="0"/>
+          <a:chOff x="0" y="0"/>
+          <a:chExt cx="0" cy="0"/>
+        </a:xfrm>
+      </p:grpSpPr>
+      <p:sp>
+        <p:nvSpPr>
+          <p:cNvPr id="2" name="TextBox 2"/>
+          <p:cNvSpPr txBox="1"/>
+          <p:nvPr/>
+        </p:nvSpPr>
+        <p:spPr>
+          <a:xfrm>
+            <a:off x="6820198" y="158953"/>
+            <a:ext cx="4762202" cy="833562"/>
+          </a:xfrm>
+          <a:prstGeom prst="rect">
+            <a:avLst/>
+          </a:prstGeom>
+        </p:spPr>
+        <p:txBody>
+          <a:bodyPr wrap="square" lIns="0" tIns="0" rIns="0" bIns="0" rtlCol="0" anchor="t">
+            <a:spAutoFit/>
+          </a:bodyPr>
+          <a:lstStyle/>
+          <a:p>
+            <a:pPr algn="ctr">
+              <a:lnSpc>
+                <a:spcPts val="6507"/>
+              </a:lnSpc>
+              <a:spcBef>
+                <a:spcPct val="0"/>
+              </a:spcBef>
+            </a:pPr>
+            <a:r>
+              <a:rPr lang="en-US" sz="6380" b="1" spc="-127" dirty="0">
+                <a:solidFill>
+                  <a:srgbClr val="FFFFFF"/>
+                </a:solidFill>
+                <a:latin typeface="Glacial Indifference Bold"/>
+                <a:ea typeface="Glacial Indifference Bold"/>
+                <a:cs typeface="Glacial Indifference Bold"/>
+                <a:sym typeface="Glacial Indifference Bold"/>
+              </a:rPr>
+              <a:t>TECH STACK</a:t>
+            </a:r>
+          </a:p>
+        </p:txBody>
+      </p:sp>
+      <p:sp>
+        <p:nvSpPr>
+          <p:cNvPr id="3" name="Freeform 3"/>
+          <p:cNvSpPr/>
+          <p:nvPr/>
+        </p:nvSpPr>
+        <p:spPr>
+          <a:xfrm>
+            <a:off x="170181" y="180924"/>
+            <a:ext cx="1131848" cy="730556"/>
+          </a:xfrm>
+          <a:custGeom>
+            <a:avLst/>
+            <a:gdLst/>
+            <a:ahLst/>
+            <a:cxnLst/>
+            <a:rect l="l" t="t" r="r" b="b"/>
+            <a:pathLst>
+              <a:path w="1131848" h="730556">
+                <a:moveTo>
+                  <a:pt x="0" y="0"/>
+                </a:moveTo>
+                <a:lnTo>
+                  <a:pt x="1131847" y="0"/>
+                </a:lnTo>
+                <a:lnTo>
+                  <a:pt x="1131847" y="730556"/>
+                </a:lnTo>
+                <a:lnTo>
+                  <a:pt x="0" y="730556"/>
+                </a:lnTo>
+                <a:lnTo>
+                  <a:pt x="0" y="0"/>
+                </a:lnTo>
+                <a:close/>
+              </a:path>
+            </a:pathLst>
+          </a:custGeom>
+          <a:blipFill>
+            <a:blip r:embed="rId2">
+              <a:extLst>
+                <a:ext uri="{96DAC541-7B7A-43D3-8B79-37D633B846F1}">
+                  <asvg:svgBlip xmlns:asvg="http://schemas.microsoft.com/office/drawing/2016/SVG/main" r:embed="rId3"/>
+                </a:ext>
+              </a:extLst>
+            </a:blip>
+            <a:stretch>
+              <a:fillRect/>
+            </a:stretch>
+          </a:blipFill>
+        </p:spPr>
+      </p:sp>
+      <p:sp>
+        <p:nvSpPr>
+          <p:cNvPr id="4" name="TextBox 4"/>
+          <p:cNvSpPr txBox="1"/>
+          <p:nvPr/>
+        </p:nvSpPr>
+        <p:spPr>
+          <a:xfrm>
             <a:off x="3677781" y="1287048"/>
             <a:ext cx="11028819" cy="503225"/>
           </a:xfrm>
@@ -5846,7 +6104,7 @@
 </p:sld>
 </file>
 
-<file path=ppt/slides/slide8.xml><?xml version="1.0" encoding="utf-8"?>
+<file path=ppt/slides/slide9.xml><?xml version="1.0" encoding="utf-8"?>
 <p:sld xmlns:a="http://schemas.openxmlformats.org/drawingml/2006/main" xmlns:r="http://schemas.openxmlformats.org/officeDocument/2006/relationships" xmlns:p="http://schemas.openxmlformats.org/presentationml/2006/main">
   <p:cSld>
     <p:bg>

</xml_diff>